<commit_message>
This is my final year project updated on 19 Sep-2024
</commit_message>
<xml_diff>
--- a/Project Presentation Final.pptx
+++ b/Project Presentation Final.pptx
@@ -260,7 +260,7 @@
   </p:defaultTextStyle>
   <p:extLst>
     <p:ext uri="{EFAFB233-063F-42B5-8137-9DF3F51BA10A}">
-      <p15:sldGuideLst xmlns="" xmlns:p15="http://schemas.microsoft.com/office/powerpoint/2012/main">
+      <p15:sldGuideLst xmlns:p15="http://schemas.microsoft.com/office/powerpoint/2012/main" xmlns="">
         <p15:guide id="1" orient="horz" pos="344">
           <p15:clr>
             <a:srgbClr val="A4A3A4"/>
@@ -284,7 +284,7 @@
       </p15:sldGuideLst>
     </p:ext>
     <p:ext uri="http://customooxmlschemas.google.com/">
-      <go:slidesCustomData xmlns="" xmlns:mc="http://schemas.openxmlformats.org/markup-compatibility/2006" xmlns:mv="urn:schemas-microsoft-com:mac:vml" xmlns:c="http://schemas.openxmlformats.org/drawingml/2006/chart" xmlns:dgm="http://schemas.openxmlformats.org/drawingml/2006/diagram" xmlns:o="urn:schemas-microsoft-com:office:office" xmlns:v="urn:schemas-microsoft-com:vml" xmlns:pvml="urn:schemas-microsoft-com:office:powerpoint" xmlns:com="http://schemas.openxmlformats.org/drawingml/2006/compatibility" xmlns:p14="http://schemas.microsoft.com/office/powerpoint/2010/main" xmlns:p15="http://schemas.microsoft.com/office/powerpoint/2012/main" xmlns:ahyp="http://schemas.microsoft.com/office/drawing/2018/hyperlinkcolor" xmlns:go="http://customooxmlschemas.google.com/" r:id="rId21" roundtripDataSignature="AMtx7mhT/6H0DgeMzTnMSrln8GQuvgej0Q=="/>
+      <go:slidesCustomData xmlns:go="http://customooxmlschemas.google.com/" xmlns:ahyp="http://schemas.microsoft.com/office/drawing/2018/hyperlinkcolor" xmlns:p15="http://schemas.microsoft.com/office/powerpoint/2012/main" xmlns:p14="http://schemas.microsoft.com/office/powerpoint/2010/main" xmlns:com="http://schemas.openxmlformats.org/drawingml/2006/compatibility" xmlns:pvml="urn:schemas-microsoft-com:office:powerpoint" xmlns:v="urn:schemas-microsoft-com:vml" xmlns:o="urn:schemas-microsoft-com:office:office" xmlns:dgm="http://schemas.openxmlformats.org/drawingml/2006/diagram" xmlns:c="http://schemas.openxmlformats.org/drawingml/2006/chart" xmlns:mv="urn:schemas-microsoft-com:mac:vml" xmlns:mc="http://schemas.openxmlformats.org/markup-compatibility/2006" xmlns="" r:id="rId21" roundtripDataSignature="AMtx7mhT/6H0DgeMzTnMSrln8GQuvgej0Q=="/>
     </p:ext>
   </p:extLst>
 </p:presentation>
@@ -16960,7 +16960,7 @@
     </p:spTree>
     <p:extLst>
       <p:ext uri="{BB962C8B-B14F-4D97-AF65-F5344CB8AC3E}">
-        <p14:creationId xmlns="" xmlns:p14="http://schemas.microsoft.com/office/powerpoint/2010/main" val="3601817788"/>
+        <p14:creationId xmlns:p14="http://schemas.microsoft.com/office/powerpoint/2010/main" xmlns="" val="3601817788"/>
       </p:ext>
     </p:extLst>
   </p:cSld>
@@ -17427,7 +17427,7 @@
     </p:spTree>
     <p:extLst>
       <p:ext uri="{BB962C8B-B14F-4D97-AF65-F5344CB8AC3E}">
-        <p14:creationId xmlns="" xmlns:p14="http://schemas.microsoft.com/office/powerpoint/2010/main" val="572681521"/>
+        <p14:creationId xmlns:p14="http://schemas.microsoft.com/office/powerpoint/2010/main" xmlns="" val="572681521"/>
       </p:ext>
     </p:extLst>
   </p:cSld>
@@ -17823,7 +17823,7 @@
           <a:noFill/>
           <a:extLst>
             <a:ext uri="{909E8E84-426E-40DD-AFC4-6F175D3DCCD1}">
-              <a14:hiddenFill xmlns="" xmlns:a14="http://schemas.microsoft.com/office/drawing/2010/main">
+              <a14:hiddenFill xmlns:a14="http://schemas.microsoft.com/office/drawing/2010/main" xmlns="">
                 <a:solidFill>
                   <a:srgbClr val="FFFFFF"/>
                 </a:solidFill>
@@ -17855,7 +17855,7 @@
           <a:blip r:embed="rId2">
             <a:extLst>
               <a:ext uri="{28A0092B-C50C-407E-A947-70E740481C1C}">
-                <a14:useLocalDpi xmlns="" xmlns:a14="http://schemas.microsoft.com/office/drawing/2010/main" val="0"/>
+                <a14:useLocalDpi xmlns:a14="http://schemas.microsoft.com/office/drawing/2010/main" xmlns="" val="0"/>
               </a:ext>
             </a:extLst>
           </a:blip>
@@ -17875,7 +17875,7 @@
           <a:noFill/>
           <a:extLst>
             <a:ext uri="{909E8E84-426E-40DD-AFC4-6F175D3DCCD1}">
-              <a14:hiddenFill xmlns="" xmlns:a14="http://schemas.microsoft.com/office/drawing/2010/main">
+              <a14:hiddenFill xmlns:a14="http://schemas.microsoft.com/office/drawing/2010/main" xmlns="">
                 <a:solidFill>
                   <a:srgbClr val="FFFFFF"/>
                 </a:solidFill>
@@ -17887,7 +17887,7 @@
     </p:spTree>
     <p:extLst>
       <p:ext uri="{BB962C8B-B14F-4D97-AF65-F5344CB8AC3E}">
-        <p14:creationId xmlns="" xmlns:p14="http://schemas.microsoft.com/office/powerpoint/2010/main" val="2718879832"/>
+        <p14:creationId xmlns:p14="http://schemas.microsoft.com/office/powerpoint/2010/main" xmlns="" val="2718879832"/>
       </p:ext>
     </p:extLst>
   </p:cSld>
@@ -18311,7 +18311,7 @@
     </p:spTree>
     <p:extLst>
       <p:ext uri="{BB962C8B-B14F-4D97-AF65-F5344CB8AC3E}">
-        <p14:creationId xmlns="" xmlns:p14="http://schemas.microsoft.com/office/powerpoint/2010/main" val="488838879"/>
+        <p14:creationId xmlns:p14="http://schemas.microsoft.com/office/powerpoint/2010/main" xmlns="" val="488838879"/>
       </p:ext>
     </p:extLst>
   </p:cSld>
@@ -18343,7 +18343,7 @@
           <p:cNvPr id="4" name="Slide Number Placeholder 3">
             <a:extLst>
               <a:ext uri="{FF2B5EF4-FFF2-40B4-BE49-F238E27FC236}">
-                <a16:creationId xmlns="" xmlns:a16="http://schemas.microsoft.com/office/drawing/2014/main" id="{5D46E110-037D-A644-6176-EA3F50D5C24E}"/>
+                <a16:creationId xmlns:a16="http://schemas.microsoft.com/office/drawing/2014/main" xmlns="" id="{5D46E110-037D-A644-6176-EA3F50D5C24E}"/>
               </a:ext>
             </a:extLst>
           </p:cNvPr>
@@ -18381,7 +18381,7 @@
           <p:cNvPr id="5" name="Picture 4" descr="A diagram of fruit and fruit&#10;&#10;Description automatically generated">
             <a:extLst>
               <a:ext uri="{FF2B5EF4-FFF2-40B4-BE49-F238E27FC236}">
-                <a16:creationId xmlns="" xmlns:a16="http://schemas.microsoft.com/office/drawing/2014/main" id="{0FAEFEF4-6560-ECE9-4A07-9D87AA52984A}"/>
+                <a16:creationId xmlns:a16="http://schemas.microsoft.com/office/drawing/2014/main" xmlns="" id="{0FAEFEF4-6560-ECE9-4A07-9D87AA52984A}"/>
               </a:ext>
             </a:extLst>
           </p:cNvPr>
@@ -18411,7 +18411,7 @@
           <p:cNvPr id="6" name="Rectangle 5">
             <a:extLst>
               <a:ext uri="{FF2B5EF4-FFF2-40B4-BE49-F238E27FC236}">
-                <a16:creationId xmlns="" xmlns:a16="http://schemas.microsoft.com/office/drawing/2014/main" id="{D3D00983-576F-C68C-6E88-FF9AD549D339}"/>
+                <a16:creationId xmlns:a16="http://schemas.microsoft.com/office/drawing/2014/main" xmlns="" id="{D3D00983-576F-C68C-6E88-FF9AD549D339}"/>
               </a:ext>
             </a:extLst>
           </p:cNvPr>
@@ -18458,7 +18458,7 @@
     </p:spTree>
     <p:extLst>
       <p:ext uri="{BB962C8B-B14F-4D97-AF65-F5344CB8AC3E}">
-        <p14:creationId xmlns="" xmlns:p14="http://schemas.microsoft.com/office/powerpoint/2010/main" val="797326793"/>
+        <p14:creationId xmlns:p14="http://schemas.microsoft.com/office/powerpoint/2010/main" xmlns="" val="797326793"/>
       </p:ext>
     </p:extLst>
   </p:cSld>
@@ -18971,7 +18971,7 @@
     </p:spTree>
     <p:extLst>
       <p:ext uri="{BB962C8B-B14F-4D97-AF65-F5344CB8AC3E}">
-        <p14:creationId xmlns="" xmlns:p14="http://schemas.microsoft.com/office/powerpoint/2010/main" val="4121204084"/>
+        <p14:creationId xmlns:p14="http://schemas.microsoft.com/office/powerpoint/2010/main" xmlns="" val="4121204084"/>
       </p:ext>
     </p:extLst>
   </p:cSld>
@@ -21259,7 +21259,7 @@
         <p:spPr>
           <a:xfrm>
             <a:off x="1303478" y="7884308"/>
-            <a:ext cx="6511200" cy="2585283"/>
+            <a:ext cx="6511200" cy="2031285"/>
           </a:xfrm>
           <a:prstGeom prst="rect">
             <a:avLst/>
@@ -21345,86 +21345,6 @@
             <a:pPr>
               <a:buSzPts val="3600"/>
             </a:pPr>
-            <a:r>
-              <a:rPr lang="en-US" sz="3600" b="1" dirty="0" err="1">
-                <a:latin typeface="Calibri" panose="020F0502020204030204" pitchFamily="34" charset="0"/>
-                <a:cs typeface="Calibri" panose="020F0502020204030204" pitchFamily="34" charset="0"/>
-              </a:rPr>
-              <a:t>Mayisa</a:t>
-            </a:r>
-            <a:r>
-              <a:rPr lang="en-US" sz="3600" b="1" dirty="0">
-                <a:latin typeface="Calibri" panose="020F0502020204030204" pitchFamily="34" charset="0"/>
-                <a:cs typeface="Calibri" panose="020F0502020204030204" pitchFamily="34" charset="0"/>
-              </a:rPr>
-              <a:t> </a:t>
-            </a:r>
-            <a:r>
-              <a:rPr lang="en-US" sz="3600" b="1" dirty="0" err="1" smtClean="0">
-                <a:latin typeface="Calibri" panose="020F0502020204030204" pitchFamily="34" charset="0"/>
-                <a:cs typeface="Calibri" panose="020F0502020204030204" pitchFamily="34" charset="0"/>
-              </a:rPr>
-              <a:t>Sanchita</a:t>
-            </a:r>
-            <a:r>
-              <a:rPr lang="en-US" sz="3600" b="1" dirty="0">
-                <a:latin typeface="Calibri" panose="020F0502020204030204" pitchFamily="34" charset="0"/>
-                <a:cs typeface="Calibri" panose="020F0502020204030204" pitchFamily="34" charset="0"/>
-              </a:rPr>
-              <a:t> </a:t>
-            </a:r>
-            <a:r>
-              <a:rPr lang="en-US" sz="3600" b="1" dirty="0" smtClean="0">
-                <a:solidFill>
-                  <a:schemeClr val="dk1"/>
-                </a:solidFill>
-                <a:latin typeface="Calibri"/>
-                <a:cs typeface="Calibri"/>
-                <a:sym typeface="Calibri"/>
-              </a:rPr>
-              <a:t>(1612076130)</a:t>
-            </a:r>
-          </a:p>
-          <a:p>
-            <a:pPr lvl="0">
-              <a:buSzPts val="3600"/>
-            </a:pPr>
-            <a:r>
-              <a:rPr lang="en-US" sz="3600" b="1" dirty="0" smtClean="0">
-                <a:solidFill>
-                  <a:schemeClr val="dk1"/>
-                </a:solidFill>
-                <a:latin typeface="Calibri"/>
-                <a:ea typeface="Calibri"/>
-                <a:cs typeface="Calibri"/>
-                <a:sym typeface="Calibri"/>
-              </a:rPr>
-              <a:t>Md. </a:t>
-            </a:r>
-            <a:r>
-              <a:rPr lang="en-US" sz="3600" b="1" dirty="0" err="1" smtClean="0">
-                <a:solidFill>
-                  <a:schemeClr val="dk1"/>
-                </a:solidFill>
-                <a:latin typeface="Calibri"/>
-                <a:ea typeface="Calibri"/>
-                <a:cs typeface="Calibri"/>
-                <a:sym typeface="Calibri"/>
-              </a:rPr>
-              <a:t>Julfiker</a:t>
-            </a:r>
-            <a:r>
-              <a:rPr lang="en-US" sz="3600" b="1" dirty="0" smtClean="0">
-                <a:solidFill>
-                  <a:schemeClr val="dk1"/>
-                </a:solidFill>
-                <a:latin typeface="Calibri"/>
-                <a:ea typeface="Calibri"/>
-                <a:cs typeface="Calibri"/>
-                <a:sym typeface="Calibri"/>
-              </a:rPr>
-              <a:t> Ali (1710476105)</a:t>
-            </a:r>
             <a:endParaRPr lang="en-US" sz="3600" b="1" dirty="0" smtClean="0"/>
           </a:p>
           <a:p>
@@ -24286,7 +24206,7 @@
           <p:cNvPr id="3" name="Rectangle: Rounded Corners 2">
             <a:extLst>
               <a:ext uri="{FF2B5EF4-FFF2-40B4-BE49-F238E27FC236}">
-                <a16:creationId xmlns="" xmlns:a16="http://schemas.microsoft.com/office/drawing/2014/main" id="{F8509B25-C75F-44BD-B490-8AEC88AAE75B}"/>
+                <a16:creationId xmlns:a16="http://schemas.microsoft.com/office/drawing/2014/main" xmlns="" id="{F8509B25-C75F-44BD-B490-8AEC88AAE75B}"/>
               </a:ext>
             </a:extLst>
           </p:cNvPr>
@@ -25063,7 +24983,7 @@
           <p:cNvPr id="4" name="Slide Number Placeholder 3">
             <a:extLst>
               <a:ext uri="{FF2B5EF4-FFF2-40B4-BE49-F238E27FC236}">
-                <a16:creationId xmlns="" xmlns:a16="http://schemas.microsoft.com/office/drawing/2014/main" id="{D2A1AE1B-9043-944A-6F49-3310B00D9F02}"/>
+                <a16:creationId xmlns:a16="http://schemas.microsoft.com/office/drawing/2014/main" xmlns="" id="{D2A1AE1B-9043-944A-6F49-3310B00D9F02}"/>
               </a:ext>
             </a:extLst>
           </p:cNvPr>
@@ -25388,7 +25308,7 @@
     </p:spTree>
     <p:extLst>
       <p:ext uri="{BB962C8B-B14F-4D97-AF65-F5344CB8AC3E}">
-        <p14:creationId xmlns="" xmlns:p14="http://schemas.microsoft.com/office/powerpoint/2010/main" val="3515920420"/>
+        <p14:creationId xmlns:p14="http://schemas.microsoft.com/office/powerpoint/2010/main" xmlns="" val="3515920420"/>
       </p:ext>
     </p:extLst>
   </p:cSld>
@@ -25420,7 +25340,7 @@
           <p:cNvPr id="3" name="Subtitle 2">
             <a:extLst>
               <a:ext uri="{FF2B5EF4-FFF2-40B4-BE49-F238E27FC236}">
-                <a16:creationId xmlns="" xmlns:a16="http://schemas.microsoft.com/office/drawing/2014/main" id="{1634BFC7-0A80-1427-6A4C-FE6E58888B24}"/>
+                <a16:creationId xmlns:a16="http://schemas.microsoft.com/office/drawing/2014/main" xmlns="" id="{1634BFC7-0A80-1427-6A4C-FE6E58888B24}"/>
               </a:ext>
             </a:extLst>
           </p:cNvPr>
@@ -25661,7 +25581,7 @@
           <p:cNvPr id="4" name="Slide Number Placeholder 3">
             <a:extLst>
               <a:ext uri="{FF2B5EF4-FFF2-40B4-BE49-F238E27FC236}">
-                <a16:creationId xmlns="" xmlns:a16="http://schemas.microsoft.com/office/drawing/2014/main" id="{E40AF5B6-151F-2887-B1E4-30BC2160BFC6}"/>
+                <a16:creationId xmlns:a16="http://schemas.microsoft.com/office/drawing/2014/main" xmlns="" id="{E40AF5B6-151F-2887-B1E4-30BC2160BFC6}"/>
               </a:ext>
             </a:extLst>
           </p:cNvPr>
@@ -26005,7 +25925,7 @@
     </p:spTree>
     <p:extLst>
       <p:ext uri="{BB962C8B-B14F-4D97-AF65-F5344CB8AC3E}">
-        <p14:creationId xmlns="" xmlns:p14="http://schemas.microsoft.com/office/powerpoint/2010/main" val="756618503"/>
+        <p14:creationId xmlns:p14="http://schemas.microsoft.com/office/powerpoint/2010/main" xmlns="" val="756618503"/>
       </p:ext>
     </p:extLst>
   </p:cSld>
@@ -26037,7 +25957,7 @@
           <p:cNvPr id="3" name="Subtitle 2">
             <a:extLst>
               <a:ext uri="{FF2B5EF4-FFF2-40B4-BE49-F238E27FC236}">
-                <a16:creationId xmlns="" xmlns:a16="http://schemas.microsoft.com/office/drawing/2014/main" id="{3BF272F1-9BF6-A7B5-8480-09F845363A73}"/>
+                <a16:creationId xmlns:a16="http://schemas.microsoft.com/office/drawing/2014/main" xmlns="" id="{3BF272F1-9BF6-A7B5-8480-09F845363A73}"/>
               </a:ext>
             </a:extLst>
           </p:cNvPr>
@@ -26177,7 +26097,7 @@
           <p:cNvPr id="4" name="Slide Number Placeholder 3">
             <a:extLst>
               <a:ext uri="{FF2B5EF4-FFF2-40B4-BE49-F238E27FC236}">
-                <a16:creationId xmlns="" xmlns:a16="http://schemas.microsoft.com/office/drawing/2014/main" id="{46BAAC5D-21D6-BEF8-26E6-3C196C423324}"/>
+                <a16:creationId xmlns:a16="http://schemas.microsoft.com/office/drawing/2014/main" xmlns="" id="{46BAAC5D-21D6-BEF8-26E6-3C196C423324}"/>
               </a:ext>
             </a:extLst>
           </p:cNvPr>
@@ -26521,7 +26441,7 @@
     </p:spTree>
     <p:extLst>
       <p:ext uri="{BB962C8B-B14F-4D97-AF65-F5344CB8AC3E}">
-        <p14:creationId xmlns="" xmlns:p14="http://schemas.microsoft.com/office/powerpoint/2010/main" val="551553072"/>
+        <p14:creationId xmlns:p14="http://schemas.microsoft.com/office/powerpoint/2010/main" xmlns="" val="551553072"/>
       </p:ext>
     </p:extLst>
   </p:cSld>

</xml_diff>